<commit_message>
edit ppt for class
</commit_message>
<xml_diff>
--- a/4. Data exploration/Data_exploration.pptx
+++ b/4. Data exploration/Data_exploration.pptx
@@ -10,9 +10,6 @@
     <p:sldId id="260" r:id="rId4"/>
     <p:sldId id="257" r:id="rId5"/>
     <p:sldId id="258" r:id="rId6"/>
-    <p:sldId id="261" r:id="rId7"/>
-    <p:sldId id="262" r:id="rId8"/>
-    <p:sldId id="264" r:id="rId9"/>
   </p:sldIdLst>
   <p:sldSz cx="12192000" cy="6858000"/>
   <p:notesSz cx="6858000" cy="9144000"/>
@@ -248,7 +245,7 @@
           <a:p>
             <a:fld id="{5D7A1F8C-62F5-5C43-8A5F-0B140731EF0C}" type="datetimeFigureOut">
               <a:rPr lang="en-US" smtClean="0"/>
-              <a:t>10/8/19</a:t>
+              <a:t>10/15/19</a:t>
             </a:fld>
             <a:endParaRPr lang="en-US"/>
           </a:p>
@@ -416,7 +413,7 @@
           <a:p>
             <a:fld id="{5D7A1F8C-62F5-5C43-8A5F-0B140731EF0C}" type="datetimeFigureOut">
               <a:rPr lang="en-US" smtClean="0"/>
-              <a:t>10/8/19</a:t>
+              <a:t>10/15/19</a:t>
             </a:fld>
             <a:endParaRPr lang="en-US"/>
           </a:p>
@@ -594,7 +591,7 @@
           <a:p>
             <a:fld id="{5D7A1F8C-62F5-5C43-8A5F-0B140731EF0C}" type="datetimeFigureOut">
               <a:rPr lang="en-US" smtClean="0"/>
-              <a:t>10/8/19</a:t>
+              <a:t>10/15/19</a:t>
             </a:fld>
             <a:endParaRPr lang="en-US"/>
           </a:p>
@@ -762,7 +759,7 @@
           <a:p>
             <a:fld id="{5D7A1F8C-62F5-5C43-8A5F-0B140731EF0C}" type="datetimeFigureOut">
               <a:rPr lang="en-US" smtClean="0"/>
-              <a:t>10/8/19</a:t>
+              <a:t>10/15/19</a:t>
             </a:fld>
             <a:endParaRPr lang="en-US"/>
           </a:p>
@@ -1007,7 +1004,7 @@
           <a:p>
             <a:fld id="{5D7A1F8C-62F5-5C43-8A5F-0B140731EF0C}" type="datetimeFigureOut">
               <a:rPr lang="en-US" smtClean="0"/>
-              <a:t>10/8/19</a:t>
+              <a:t>10/15/19</a:t>
             </a:fld>
             <a:endParaRPr lang="en-US"/>
           </a:p>
@@ -1236,7 +1233,7 @@
           <a:p>
             <a:fld id="{5D7A1F8C-62F5-5C43-8A5F-0B140731EF0C}" type="datetimeFigureOut">
               <a:rPr lang="en-US" smtClean="0"/>
-              <a:t>10/8/19</a:t>
+              <a:t>10/15/19</a:t>
             </a:fld>
             <a:endParaRPr lang="en-US"/>
           </a:p>
@@ -1600,7 +1597,7 @@
           <a:p>
             <a:fld id="{5D7A1F8C-62F5-5C43-8A5F-0B140731EF0C}" type="datetimeFigureOut">
               <a:rPr lang="en-US" smtClean="0"/>
-              <a:t>10/8/19</a:t>
+              <a:t>10/15/19</a:t>
             </a:fld>
             <a:endParaRPr lang="en-US"/>
           </a:p>
@@ -1717,7 +1714,7 @@
           <a:p>
             <a:fld id="{5D7A1F8C-62F5-5C43-8A5F-0B140731EF0C}" type="datetimeFigureOut">
               <a:rPr lang="en-US" smtClean="0"/>
-              <a:t>10/8/19</a:t>
+              <a:t>10/15/19</a:t>
             </a:fld>
             <a:endParaRPr lang="en-US"/>
           </a:p>
@@ -1812,7 +1809,7 @@
           <a:p>
             <a:fld id="{5D7A1F8C-62F5-5C43-8A5F-0B140731EF0C}" type="datetimeFigureOut">
               <a:rPr lang="en-US" smtClean="0"/>
-              <a:t>10/8/19</a:t>
+              <a:t>10/15/19</a:t>
             </a:fld>
             <a:endParaRPr lang="en-US"/>
           </a:p>
@@ -2087,7 +2084,7 @@
           <a:p>
             <a:fld id="{5D7A1F8C-62F5-5C43-8A5F-0B140731EF0C}" type="datetimeFigureOut">
               <a:rPr lang="en-US" smtClean="0"/>
-              <a:t>10/8/19</a:t>
+              <a:t>10/15/19</a:t>
             </a:fld>
             <a:endParaRPr lang="en-US"/>
           </a:p>
@@ -2339,7 +2336,7 @@
           <a:p>
             <a:fld id="{5D7A1F8C-62F5-5C43-8A5F-0B140731EF0C}" type="datetimeFigureOut">
               <a:rPr lang="en-US" smtClean="0"/>
-              <a:t>10/8/19</a:t>
+              <a:t>10/15/19</a:t>
             </a:fld>
             <a:endParaRPr lang="en-US"/>
           </a:p>
@@ -2550,7 +2547,7 @@
           <a:p>
             <a:fld id="{5D7A1F8C-62F5-5C43-8A5F-0B140731EF0C}" type="datetimeFigureOut">
               <a:rPr lang="en-US" smtClean="0"/>
-              <a:t>10/8/19</a:t>
+              <a:t>10/15/19</a:t>
             </a:fld>
             <a:endParaRPr lang="en-US"/>
           </a:p>
@@ -3486,289 +3483,6 @@
 </p:sld>
 </file>
 
-<file path=ppt/slides/slide6.xml><?xml version="1.0" encoding="utf-8"?>
-<p:sld xmlns:a="http://schemas.openxmlformats.org/drawingml/2006/main" xmlns:r="http://schemas.openxmlformats.org/officeDocument/2006/relationships" xmlns:p="http://schemas.openxmlformats.org/presentationml/2006/main">
-  <p:cSld>
-    <p:spTree>
-      <p:nvGrpSpPr>
-        <p:cNvPr id="1" name=""/>
-        <p:cNvGrpSpPr/>
-        <p:nvPr/>
-      </p:nvGrpSpPr>
-      <p:grpSpPr>
-        <a:xfrm>
-          <a:off x="0" y="0"/>
-          <a:ext cx="0" cy="0"/>
-          <a:chOff x="0" y="0"/>
-          <a:chExt cx="0" cy="0"/>
-        </a:xfrm>
-      </p:grpSpPr>
-      <p:sp>
-        <p:nvSpPr>
-          <p:cNvPr id="2" name="Title 1"/>
-          <p:cNvSpPr>
-            <a:spLocks noGrp="1"/>
-          </p:cNvSpPr>
-          <p:nvPr>
-            <p:ph type="title"/>
-          </p:nvPr>
-        </p:nvSpPr>
-        <p:spPr/>
-        <p:txBody>
-          <a:bodyPr/>
-          <a:lstStyle/>
-          <a:p>
-            <a:r>
-              <a:rPr lang="en-US" dirty="0"/>
-              <a:t>Types of graphics</a:t>
-            </a:r>
-          </a:p>
-        </p:txBody>
-      </p:sp>
-      <p:sp>
-        <p:nvSpPr>
-          <p:cNvPr id="3" name="Content Placeholder 2"/>
-          <p:cNvSpPr>
-            <a:spLocks noGrp="1"/>
-          </p:cNvSpPr>
-          <p:nvPr>
-            <p:ph idx="1"/>
-          </p:nvPr>
-        </p:nvSpPr>
-        <p:spPr>
-          <a:xfrm>
-            <a:off x="838200" y="1825625"/>
-            <a:ext cx="2764809" cy="4351338"/>
-          </a:xfrm>
-        </p:spPr>
-        <p:txBody>
-          <a:bodyPr/>
-          <a:lstStyle/>
-          <a:p>
-            <a:r>
-              <a:rPr lang="en-US" dirty="0"/>
-              <a:t>Histogram – shows counts of continuous variables</a:t>
-            </a:r>
-          </a:p>
-          <a:p>
-            <a:endParaRPr lang="en-US" dirty="0"/>
-          </a:p>
-        </p:txBody>
-      </p:sp>
-    </p:spTree>
-    <p:extLst>
-      <p:ext uri="{BB962C8B-B14F-4D97-AF65-F5344CB8AC3E}">
-        <p14:creationId xmlns:p14="http://schemas.microsoft.com/office/powerpoint/2010/main" val="3768020826"/>
-      </p:ext>
-    </p:extLst>
-  </p:cSld>
-  <p:clrMapOvr>
-    <a:masterClrMapping/>
-  </p:clrMapOvr>
-</p:sld>
-</file>
-
-<file path=ppt/slides/slide7.xml><?xml version="1.0" encoding="utf-8"?>
-<p:sld xmlns:a="http://schemas.openxmlformats.org/drawingml/2006/main" xmlns:r="http://schemas.openxmlformats.org/officeDocument/2006/relationships" xmlns:p="http://schemas.openxmlformats.org/presentationml/2006/main">
-  <p:cSld>
-    <p:spTree>
-      <p:nvGrpSpPr>
-        <p:cNvPr id="1" name=""/>
-        <p:cNvGrpSpPr/>
-        <p:nvPr/>
-      </p:nvGrpSpPr>
-      <p:grpSpPr>
-        <a:xfrm>
-          <a:off x="0" y="0"/>
-          <a:ext cx="0" cy="0"/>
-          <a:chOff x="0" y="0"/>
-          <a:chExt cx="0" cy="0"/>
-        </a:xfrm>
-      </p:grpSpPr>
-      <p:sp>
-        <p:nvSpPr>
-          <p:cNvPr id="2" name="Title 1"/>
-          <p:cNvSpPr>
-            <a:spLocks noGrp="1"/>
-          </p:cNvSpPr>
-          <p:nvPr>
-            <p:ph type="title"/>
-          </p:nvPr>
-        </p:nvSpPr>
-        <p:spPr/>
-        <p:txBody>
-          <a:bodyPr/>
-          <a:lstStyle/>
-          <a:p>
-            <a:r>
-              <a:rPr lang="en-US" dirty="0"/>
-              <a:t>Types of graphics</a:t>
-            </a:r>
-          </a:p>
-        </p:txBody>
-      </p:sp>
-      <p:sp>
-        <p:nvSpPr>
-          <p:cNvPr id="3" name="Content Placeholder 2"/>
-          <p:cNvSpPr>
-            <a:spLocks noGrp="1"/>
-          </p:cNvSpPr>
-          <p:nvPr>
-            <p:ph idx="1"/>
-          </p:nvPr>
-        </p:nvSpPr>
-        <p:spPr>
-          <a:xfrm>
-            <a:off x="838200" y="1825625"/>
-            <a:ext cx="2764809" cy="4351338"/>
-          </a:xfrm>
-        </p:spPr>
-        <p:txBody>
-          <a:bodyPr>
-            <a:normAutofit fontScale="85000" lnSpcReduction="10000"/>
-          </a:bodyPr>
-          <a:lstStyle/>
-          <a:p>
-            <a:r>
-              <a:rPr lang="en-US" dirty="0"/>
-              <a:t>Boxplot – shows variation within a continuous variable</a:t>
-            </a:r>
-          </a:p>
-          <a:p>
-            <a:pPr lvl="1"/>
-            <a:endParaRPr lang="en-US" dirty="0"/>
-          </a:p>
-          <a:p>
-            <a:r>
-              <a:rPr lang="en-US" dirty="0"/>
-              <a:t>Shows minimum*, first </a:t>
-            </a:r>
-            <a:r>
-              <a:rPr lang="en-US" b="1" dirty="0"/>
-              <a:t>quartile</a:t>
-            </a:r>
-            <a:r>
-              <a:rPr lang="en-US" dirty="0"/>
-              <a:t>, median, third </a:t>
-            </a:r>
-            <a:r>
-              <a:rPr lang="en-US" b="1" dirty="0"/>
-              <a:t>quartile</a:t>
-            </a:r>
-            <a:r>
-              <a:rPr lang="en-US" dirty="0"/>
-              <a:t>, and maximum*</a:t>
-            </a:r>
-          </a:p>
-          <a:p>
-            <a:r>
-              <a:rPr lang="en-US" dirty="0"/>
-              <a:t>Violin plot is similar, but has more information</a:t>
-            </a:r>
-          </a:p>
-        </p:txBody>
-      </p:sp>
-    </p:spTree>
-    <p:extLst>
-      <p:ext uri="{BB962C8B-B14F-4D97-AF65-F5344CB8AC3E}">
-        <p14:creationId xmlns:p14="http://schemas.microsoft.com/office/powerpoint/2010/main" val="2353415141"/>
-      </p:ext>
-    </p:extLst>
-  </p:cSld>
-  <p:clrMapOvr>
-    <a:masterClrMapping/>
-  </p:clrMapOvr>
-</p:sld>
-</file>
-
-<file path=ppt/slides/slide8.xml><?xml version="1.0" encoding="utf-8"?>
-<p:sld xmlns:a="http://schemas.openxmlformats.org/drawingml/2006/main" xmlns:r="http://schemas.openxmlformats.org/officeDocument/2006/relationships" xmlns:p="http://schemas.openxmlformats.org/presentationml/2006/main">
-  <p:cSld>
-    <p:spTree>
-      <p:nvGrpSpPr>
-        <p:cNvPr id="1" name=""/>
-        <p:cNvGrpSpPr/>
-        <p:nvPr/>
-      </p:nvGrpSpPr>
-      <p:grpSpPr>
-        <a:xfrm>
-          <a:off x="0" y="0"/>
-          <a:ext cx="0" cy="0"/>
-          <a:chOff x="0" y="0"/>
-          <a:chExt cx="0" cy="0"/>
-        </a:xfrm>
-      </p:grpSpPr>
-      <p:sp>
-        <p:nvSpPr>
-          <p:cNvPr id="2" name="Title 1"/>
-          <p:cNvSpPr>
-            <a:spLocks noGrp="1"/>
-          </p:cNvSpPr>
-          <p:nvPr>
-            <p:ph type="title"/>
-          </p:nvPr>
-        </p:nvSpPr>
-        <p:spPr/>
-        <p:txBody>
-          <a:bodyPr/>
-          <a:lstStyle/>
-          <a:p>
-            <a:r>
-              <a:rPr lang="en-US" dirty="0"/>
-              <a:t>Types of graphics</a:t>
-            </a:r>
-          </a:p>
-        </p:txBody>
-      </p:sp>
-      <p:sp>
-        <p:nvSpPr>
-          <p:cNvPr id="3" name="Content Placeholder 2"/>
-          <p:cNvSpPr>
-            <a:spLocks noGrp="1"/>
-          </p:cNvSpPr>
-          <p:nvPr>
-            <p:ph idx="1"/>
-          </p:nvPr>
-        </p:nvSpPr>
-        <p:spPr>
-          <a:xfrm>
-            <a:off x="838200" y="1825625"/>
-            <a:ext cx="2764809" cy="4351338"/>
-          </a:xfrm>
-        </p:spPr>
-        <p:txBody>
-          <a:bodyPr>
-            <a:normAutofit/>
-          </a:bodyPr>
-          <a:lstStyle/>
-          <a:p>
-            <a:r>
-              <a:rPr lang="en-US" dirty="0"/>
-              <a:t>Scatterplot</a:t>
-            </a:r>
-          </a:p>
-          <a:p>
-            <a:pPr lvl="1"/>
-            <a:r>
-              <a:rPr lang="en-US" dirty="0"/>
-              <a:t>Continuous x and y data</a:t>
-            </a:r>
-          </a:p>
-        </p:txBody>
-      </p:sp>
-    </p:spTree>
-    <p:extLst>
-      <p:ext uri="{BB962C8B-B14F-4D97-AF65-F5344CB8AC3E}">
-        <p14:creationId xmlns:p14="http://schemas.microsoft.com/office/powerpoint/2010/main" val="1424817064"/>
-      </p:ext>
-    </p:extLst>
-  </p:cSld>
-  <p:clrMapOvr>
-    <a:masterClrMapping/>
-  </p:clrMapOvr>
-</p:sld>
-</file>
-
 <file path=ppt/theme/theme1.xml><?xml version="1.0" encoding="utf-8"?>
 <a:theme xmlns:a="http://schemas.openxmlformats.org/drawingml/2006/main" name="Office Theme">
   <a:themeElements>

</xml_diff>